<commit_message>
write first version of design and code
</commit_message>
<xml_diff>
--- a/Design/design.pptx
+++ b/Design/design.pptx
@@ -105,6 +105,11 @@
       </a:defRPr>
     </a:lvl9pPr>
   </p:defaultTextStyle>
+  <p:extLst>
+    <p:ext uri="{EFAFB233-063F-42B5-8137-9DF3F51BA10A}">
+      <p15:sldGuideLst xmlns:p15="http://schemas.microsoft.com/office/powerpoint/2012/main"/>
+    </p:ext>
+  </p:extLst>
 </p:presentation>
 </file>
 
@@ -255,7 +260,7 @@
           <a:p>
             <a:fld id="{C20C2282-552B-435B-9291-5C63140E639D}" type="datetimeFigureOut">
               <a:rPr lang="zh-CN" altLang="en-US" smtClean="0"/>
-              <a:t>2025/12/6</a:t>
+              <a:t>2025/12/23</a:t>
             </a:fld>
             <a:endParaRPr lang="zh-CN" altLang="en-US"/>
           </a:p>
@@ -453,7 +458,7 @@
           <a:p>
             <a:fld id="{C20C2282-552B-435B-9291-5C63140E639D}" type="datetimeFigureOut">
               <a:rPr lang="zh-CN" altLang="en-US" smtClean="0"/>
-              <a:t>2025/12/6</a:t>
+              <a:t>2025/12/23</a:t>
             </a:fld>
             <a:endParaRPr lang="zh-CN" altLang="en-US"/>
           </a:p>
@@ -661,7 +666,7 @@
           <a:p>
             <a:fld id="{C20C2282-552B-435B-9291-5C63140E639D}" type="datetimeFigureOut">
               <a:rPr lang="zh-CN" altLang="en-US" smtClean="0"/>
-              <a:t>2025/12/6</a:t>
+              <a:t>2025/12/23</a:t>
             </a:fld>
             <a:endParaRPr lang="zh-CN" altLang="en-US"/>
           </a:p>
@@ -859,7 +864,7 @@
           <a:p>
             <a:fld id="{C20C2282-552B-435B-9291-5C63140E639D}" type="datetimeFigureOut">
               <a:rPr lang="zh-CN" altLang="en-US" smtClean="0"/>
-              <a:t>2025/12/6</a:t>
+              <a:t>2025/12/23</a:t>
             </a:fld>
             <a:endParaRPr lang="zh-CN" altLang="en-US"/>
           </a:p>
@@ -1134,7 +1139,7 @@
           <a:p>
             <a:fld id="{C20C2282-552B-435B-9291-5C63140E639D}" type="datetimeFigureOut">
               <a:rPr lang="zh-CN" altLang="en-US" smtClean="0"/>
-              <a:t>2025/12/6</a:t>
+              <a:t>2025/12/23</a:t>
             </a:fld>
             <a:endParaRPr lang="zh-CN" altLang="en-US"/>
           </a:p>
@@ -1399,7 +1404,7 @@
           <a:p>
             <a:fld id="{C20C2282-552B-435B-9291-5C63140E639D}" type="datetimeFigureOut">
               <a:rPr lang="zh-CN" altLang="en-US" smtClean="0"/>
-              <a:t>2025/12/6</a:t>
+              <a:t>2025/12/23</a:t>
             </a:fld>
             <a:endParaRPr lang="zh-CN" altLang="en-US"/>
           </a:p>
@@ -1811,7 +1816,7 @@
           <a:p>
             <a:fld id="{C20C2282-552B-435B-9291-5C63140E639D}" type="datetimeFigureOut">
               <a:rPr lang="zh-CN" altLang="en-US" smtClean="0"/>
-              <a:t>2025/12/6</a:t>
+              <a:t>2025/12/23</a:t>
             </a:fld>
             <a:endParaRPr lang="zh-CN" altLang="en-US"/>
           </a:p>
@@ -1952,7 +1957,7 @@
           <a:p>
             <a:fld id="{C20C2282-552B-435B-9291-5C63140E639D}" type="datetimeFigureOut">
               <a:rPr lang="zh-CN" altLang="en-US" smtClean="0"/>
-              <a:t>2025/12/6</a:t>
+              <a:t>2025/12/23</a:t>
             </a:fld>
             <a:endParaRPr lang="zh-CN" altLang="en-US"/>
           </a:p>
@@ -2065,7 +2070,7 @@
           <a:p>
             <a:fld id="{C20C2282-552B-435B-9291-5C63140E639D}" type="datetimeFigureOut">
               <a:rPr lang="zh-CN" altLang="en-US" smtClean="0"/>
-              <a:t>2025/12/6</a:t>
+              <a:t>2025/12/23</a:t>
             </a:fld>
             <a:endParaRPr lang="zh-CN" altLang="en-US"/>
           </a:p>
@@ -2376,7 +2381,7 @@
           <a:p>
             <a:fld id="{C20C2282-552B-435B-9291-5C63140E639D}" type="datetimeFigureOut">
               <a:rPr lang="zh-CN" altLang="en-US" smtClean="0"/>
-              <a:t>2025/12/6</a:t>
+              <a:t>2025/12/23</a:t>
             </a:fld>
             <a:endParaRPr lang="zh-CN" altLang="en-US"/>
           </a:p>
@@ -2664,7 +2669,7 @@
           <a:p>
             <a:fld id="{C20C2282-552B-435B-9291-5C63140E639D}" type="datetimeFigureOut">
               <a:rPr lang="zh-CN" altLang="en-US" smtClean="0"/>
-              <a:t>2025/12/6</a:t>
+              <a:t>2025/12/23</a:t>
             </a:fld>
             <a:endParaRPr lang="zh-CN" altLang="en-US"/>
           </a:p>
@@ -2905,7 +2910,7 @@
           <a:p>
             <a:fld id="{C20C2282-552B-435B-9291-5C63140E639D}" type="datetimeFigureOut">
               <a:rPr lang="zh-CN" altLang="en-US" smtClean="0"/>
-              <a:t>2025/12/6</a:t>
+              <a:t>2025/12/23</a:t>
             </a:fld>
             <a:endParaRPr lang="zh-CN" altLang="en-US"/>
           </a:p>
@@ -3466,6 +3471,306 @@
           </a:p>
         </p:txBody>
       </p:sp>
+      <p:sp>
+        <p:nvSpPr>
+          <p:cNvPr id="2" name="TextBox 1">
+            <a:extLst>
+              <a:ext uri="{FF2B5EF4-FFF2-40B4-BE49-F238E27FC236}">
+                <a16:creationId xmlns:a16="http://schemas.microsoft.com/office/drawing/2014/main" id="{257E28FF-E788-F455-215C-2B1FA1F949B5}"/>
+              </a:ext>
+            </a:extLst>
+          </p:cNvPr>
+          <p:cNvSpPr txBox="1"/>
+          <p:nvPr/>
+        </p:nvSpPr>
+        <p:spPr>
+          <a:xfrm>
+            <a:off x="4830417" y="457200"/>
+            <a:ext cx="2862470" cy="369332"/>
+          </a:xfrm>
+          <a:prstGeom prst="rect">
+            <a:avLst/>
+          </a:prstGeom>
+          <a:noFill/>
+        </p:spPr>
+        <p:txBody>
+          <a:bodyPr wrap="square" rtlCol="0">
+            <a:spAutoFit/>
+          </a:bodyPr>
+          <a:lstStyle/>
+          <a:p>
+            <a:pPr algn="ctr"/>
+            <a:r>
+              <a:rPr lang="en-US" altLang="zh-CN" dirty="0"/>
+              <a:t>Embed</a:t>
+            </a:r>
+          </a:p>
+        </p:txBody>
+      </p:sp>
+      <p:sp>
+        <p:nvSpPr>
+          <p:cNvPr id="3" name="Rectangle: Rounded Corners 2">
+            <a:extLst>
+              <a:ext uri="{FF2B5EF4-FFF2-40B4-BE49-F238E27FC236}">
+                <a16:creationId xmlns:a16="http://schemas.microsoft.com/office/drawing/2014/main" id="{09BF3431-DA13-5075-36CA-CA8B0375ABBF}"/>
+              </a:ext>
+            </a:extLst>
+          </p:cNvPr>
+          <p:cNvSpPr/>
+          <p:nvPr/>
+        </p:nvSpPr>
+        <p:spPr>
+          <a:xfrm>
+            <a:off x="4259180" y="826532"/>
+            <a:ext cx="636104" cy="5315851"/>
+          </a:xfrm>
+          <a:prstGeom prst="roundRect">
+            <a:avLst/>
+          </a:prstGeom>
+        </p:spPr>
+        <p:style>
+          <a:lnRef idx="2">
+            <a:schemeClr val="accent1">
+              <a:shade val="15000"/>
+            </a:schemeClr>
+          </a:lnRef>
+          <a:fillRef idx="1">
+            <a:schemeClr val="accent1"/>
+          </a:fillRef>
+          <a:effectRef idx="0">
+            <a:schemeClr val="accent1"/>
+          </a:effectRef>
+          <a:fontRef idx="minor">
+            <a:schemeClr val="lt1"/>
+          </a:fontRef>
+        </p:style>
+        <p:txBody>
+          <a:bodyPr rtlCol="0" anchor="ctr"/>
+          <a:lstStyle/>
+          <a:p>
+            <a:pPr algn="ctr"/>
+            <a:endParaRPr lang="zh-CN" altLang="en-US"/>
+          </a:p>
+        </p:txBody>
+      </p:sp>
+      <p:sp>
+        <p:nvSpPr>
+          <p:cNvPr id="7" name="TextBox 6">
+            <a:extLst>
+              <a:ext uri="{FF2B5EF4-FFF2-40B4-BE49-F238E27FC236}">
+                <a16:creationId xmlns:a16="http://schemas.microsoft.com/office/drawing/2014/main" id="{949BADB5-7FDB-AC31-B770-2E0534996513}"/>
+              </a:ext>
+            </a:extLst>
+          </p:cNvPr>
+          <p:cNvSpPr txBox="1"/>
+          <p:nvPr/>
+        </p:nvSpPr>
+        <p:spPr>
+          <a:xfrm>
+            <a:off x="4259180" y="1117600"/>
+            <a:ext cx="636104" cy="246221"/>
+          </a:xfrm>
+          <a:prstGeom prst="rect">
+            <a:avLst/>
+          </a:prstGeom>
+          <a:solidFill>
+            <a:schemeClr val="accent1">
+              <a:lumMod val="75000"/>
+            </a:schemeClr>
+          </a:solidFill>
+        </p:spPr>
+        <p:txBody>
+          <a:bodyPr wrap="square" rtlCol="0">
+            <a:spAutoFit/>
+          </a:bodyPr>
+          <a:lstStyle/>
+          <a:p>
+            <a:r>
+              <a:rPr lang="en-US" altLang="zh-CN" sz="1000" dirty="0"/>
+              <a:t>Embed</a:t>
+            </a:r>
+            <a:endParaRPr lang="zh-CN" altLang="en-US" sz="1000" dirty="0"/>
+          </a:p>
+        </p:txBody>
+      </p:sp>
+      <p:sp>
+        <p:nvSpPr>
+          <p:cNvPr id="9" name="TextBox 8">
+            <a:extLst>
+              <a:ext uri="{FF2B5EF4-FFF2-40B4-BE49-F238E27FC236}">
+                <a16:creationId xmlns:a16="http://schemas.microsoft.com/office/drawing/2014/main" id="{5B511944-1EA4-7E46-58C3-2FAEDAE02C04}"/>
+              </a:ext>
+            </a:extLst>
+          </p:cNvPr>
+          <p:cNvSpPr txBox="1"/>
+          <p:nvPr/>
+        </p:nvSpPr>
+        <p:spPr>
+          <a:xfrm>
+            <a:off x="4259180" y="1531778"/>
+            <a:ext cx="636104" cy="246221"/>
+          </a:xfrm>
+          <a:prstGeom prst="rect">
+            <a:avLst/>
+          </a:prstGeom>
+          <a:noFill/>
+        </p:spPr>
+        <p:txBody>
+          <a:bodyPr wrap="square" rtlCol="0">
+            <a:spAutoFit/>
+          </a:bodyPr>
+          <a:lstStyle/>
+          <a:p>
+            <a:r>
+              <a:rPr lang="en-US" altLang="zh-CN" sz="1000" dirty="0"/>
+              <a:t>Restore</a:t>
+            </a:r>
+            <a:endParaRPr lang="zh-CN" altLang="en-US" sz="1000" dirty="0"/>
+          </a:p>
+        </p:txBody>
+      </p:sp>
+      <p:sp>
+        <p:nvSpPr>
+          <p:cNvPr id="10" name="Rectangle 9">
+            <a:extLst>
+              <a:ext uri="{FF2B5EF4-FFF2-40B4-BE49-F238E27FC236}">
+                <a16:creationId xmlns:a16="http://schemas.microsoft.com/office/drawing/2014/main" id="{D7980F0A-C961-AE23-54A4-E068512E23D7}"/>
+              </a:ext>
+            </a:extLst>
+          </p:cNvPr>
+          <p:cNvSpPr/>
+          <p:nvPr/>
+        </p:nvSpPr>
+        <p:spPr>
+          <a:xfrm>
+            <a:off x="5293895" y="1020278"/>
+            <a:ext cx="2271562" cy="2408722"/>
+          </a:xfrm>
+          <a:prstGeom prst="rect">
+            <a:avLst/>
+          </a:prstGeom>
+        </p:spPr>
+        <p:style>
+          <a:lnRef idx="2">
+            <a:schemeClr val="accent1">
+              <a:shade val="15000"/>
+            </a:schemeClr>
+          </a:lnRef>
+          <a:fillRef idx="1">
+            <a:schemeClr val="accent1"/>
+          </a:fillRef>
+          <a:effectRef idx="0">
+            <a:schemeClr val="accent1"/>
+          </a:effectRef>
+          <a:fontRef idx="minor">
+            <a:schemeClr val="lt1"/>
+          </a:fontRef>
+        </p:style>
+        <p:txBody>
+          <a:bodyPr rtlCol="0" anchor="ctr"/>
+          <a:lstStyle/>
+          <a:p>
+            <a:pPr algn="ctr"/>
+            <a:r>
+              <a:rPr lang="en-US" altLang="zh-CN" dirty="0">
+                <a:solidFill>
+                  <a:schemeClr val="accent2">
+                    <a:lumMod val="25000"/>
+                  </a:schemeClr>
+                </a:solidFill>
+              </a:rPr>
+              <a:t>Image</a:t>
+            </a:r>
+            <a:endParaRPr lang="zh-CN" altLang="en-US" dirty="0">
+              <a:solidFill>
+                <a:schemeClr val="accent2">
+                  <a:lumMod val="25000"/>
+                </a:schemeClr>
+              </a:solidFill>
+            </a:endParaRPr>
+          </a:p>
+        </p:txBody>
+      </p:sp>
+      <p:sp>
+        <p:nvSpPr>
+          <p:cNvPr id="11" name="TextBox 10">
+            <a:extLst>
+              <a:ext uri="{FF2B5EF4-FFF2-40B4-BE49-F238E27FC236}">
+                <a16:creationId xmlns:a16="http://schemas.microsoft.com/office/drawing/2014/main" id="{696E248C-514D-2AA8-BE79-BED742282819}"/>
+              </a:ext>
+            </a:extLst>
+          </p:cNvPr>
+          <p:cNvSpPr txBox="1"/>
+          <p:nvPr/>
+        </p:nvSpPr>
+        <p:spPr>
+          <a:xfrm>
+            <a:off x="5293895" y="3860800"/>
+            <a:ext cx="2271562" cy="369332"/>
+          </a:xfrm>
+          <a:prstGeom prst="rect">
+            <a:avLst/>
+          </a:prstGeom>
+          <a:noFill/>
+        </p:spPr>
+        <p:txBody>
+          <a:bodyPr wrap="square" rtlCol="0">
+            <a:spAutoFit/>
+          </a:bodyPr>
+          <a:lstStyle/>
+          <a:p>
+            <a:r>
+              <a:rPr lang="en-US" altLang="zh-CN" dirty="0"/>
+              <a:t>Secret Key</a:t>
+            </a:r>
+            <a:endParaRPr lang="zh-CN" altLang="en-US" dirty="0"/>
+          </a:p>
+        </p:txBody>
+      </p:sp>
+      <p:cxnSp>
+        <p:nvCxnSpPr>
+          <p:cNvPr id="13" name="Straight Connector 12">
+            <a:extLst>
+              <a:ext uri="{FF2B5EF4-FFF2-40B4-BE49-F238E27FC236}">
+                <a16:creationId xmlns:a16="http://schemas.microsoft.com/office/drawing/2014/main" id="{CF9F7245-6E0C-95A2-7717-B63802797D6D}"/>
+              </a:ext>
+            </a:extLst>
+          </p:cNvPr>
+          <p:cNvCxnSpPr/>
+          <p:nvPr/>
+        </p:nvCxnSpPr>
+        <p:spPr>
+          <a:xfrm>
+            <a:off x="5293895" y="4309533"/>
+            <a:ext cx="2271562" cy="0"/>
+          </a:xfrm>
+          <a:prstGeom prst="line">
+            <a:avLst/>
+          </a:prstGeom>
+          <a:ln w="12700">
+            <a:solidFill>
+              <a:schemeClr val="accent1">
+                <a:lumMod val="25000"/>
+                <a:alpha val="40000"/>
+              </a:schemeClr>
+            </a:solidFill>
+          </a:ln>
+        </p:spPr>
+        <p:style>
+          <a:lnRef idx="1">
+            <a:schemeClr val="accent1"/>
+          </a:lnRef>
+          <a:fillRef idx="0">
+            <a:schemeClr val="accent1"/>
+          </a:fillRef>
+          <a:effectRef idx="0">
+            <a:schemeClr val="accent1"/>
+          </a:effectRef>
+          <a:fontRef idx="minor">
+            <a:schemeClr val="tx1"/>
+          </a:fontRef>
+        </p:style>
+      </p:cxnSp>
     </p:spTree>
     <p:extLst>
       <p:ext uri="{BB962C8B-B14F-4D97-AF65-F5344CB8AC3E}">

</xml_diff>